<commit_message>
Added notes to second status report slides
</commit_message>
<xml_diff>
--- a/Presentations/Team Status Report 7-6-12.pptx
+++ b/Presentations/Team Status Report 7-6-12.pptx
@@ -517,6 +517,16 @@
               <a:rPr lang="en-US" dirty="0" smtClean="0"/>
               <a:t>Tyler</a:t>
             </a:r>
+          </a:p>
+          <a:p>
+            <a:r>
+              <a:rPr lang="en-US" dirty="0" smtClean="0"/>
+              <a:t>Notes: Made</a:t>
+            </a:r>
+            <a:r>
+              <a:rPr lang="en-US" baseline="0" dirty="0" smtClean="0"/>
+              <a:t> our display page in paint in like 5 minutes.</a:t>
+            </a:r>
             <a:endParaRPr lang="en-US" dirty="0"/>
           </a:p>
         </p:txBody>
@@ -604,6 +614,16 @@
             <a:r>
               <a:rPr lang="en-US" dirty="0" smtClean="0"/>
               <a:t>CM</a:t>
+            </a:r>
+          </a:p>
+          <a:p>
+            <a:r>
+              <a:rPr lang="en-US" dirty="0" smtClean="0"/>
+              <a:t>Notes:</a:t>
+            </a:r>
+            <a:r>
+              <a:rPr lang="en-US" baseline="0" dirty="0" smtClean="0"/>
+              <a:t> What we’ll continue working on. Finalizing Requirements MUST come before SRD Document.</a:t>
             </a:r>
             <a:endParaRPr lang="en-US" dirty="0"/>
           </a:p>
@@ -693,6 +713,16 @@
               <a:rPr lang="en-US" dirty="0" smtClean="0"/>
               <a:t>Tyler</a:t>
             </a:r>
+          </a:p>
+          <a:p>
+            <a:r>
+              <a:rPr lang="en-US" dirty="0" smtClean="0"/>
+              <a:t>Notes: These are the same as from</a:t>
+            </a:r>
+            <a:r>
+              <a:rPr lang="en-US" baseline="0" dirty="0" smtClean="0"/>
+              <a:t> our last presentation</a:t>
+            </a:r>
             <a:endParaRPr lang="en-US" dirty="0"/>
           </a:p>
         </p:txBody>
@@ -780,6 +810,12 @@
             <a:r>
               <a:rPr lang="en-US" dirty="0" smtClean="0"/>
               <a:t>Tyler</a:t>
+            </a:r>
+          </a:p>
+          <a:p>
+            <a:r>
+              <a:rPr lang="en-US" dirty="0" smtClean="0"/>
+              <a:t>Notes: Just a very early vague description of the project</a:t>
             </a:r>
             <a:endParaRPr lang="en-US" dirty="0"/>
           </a:p>
@@ -869,6 +905,16 @@
               <a:rPr lang="en-US" dirty="0" smtClean="0"/>
               <a:t>Lloyd</a:t>
             </a:r>
+          </a:p>
+          <a:p>
+            <a:r>
+              <a:rPr lang="en-US" dirty="0" smtClean="0"/>
+              <a:t>Notes: What we’ve been doing</a:t>
+            </a:r>
+            <a:r>
+              <a:rPr lang="en-US" baseline="0" dirty="0" smtClean="0"/>
+              <a:t> at meetings, Outcomes explained in detail in following slides</a:t>
+            </a:r>
             <a:endParaRPr lang="en-US" dirty="0"/>
           </a:p>
         </p:txBody>
@@ -956,6 +1002,16 @@
             <a:r>
               <a:rPr lang="en-US" dirty="0" smtClean="0"/>
               <a:t>Lloyd</a:t>
+            </a:r>
+          </a:p>
+          <a:p>
+            <a:r>
+              <a:rPr lang="en-US" dirty="0" smtClean="0"/>
+              <a:t>Notes: How</a:t>
+            </a:r>
+            <a:r>
+              <a:rPr lang="en-US" baseline="0" dirty="0" smtClean="0"/>
+              <a:t> we imagine the end product</a:t>
             </a:r>
             <a:endParaRPr lang="en-US" dirty="0"/>
           </a:p>
@@ -1045,6 +1101,12 @@
               <a:rPr lang="en-US" dirty="0" smtClean="0"/>
               <a:t>Lloyd</a:t>
             </a:r>
+          </a:p>
+          <a:p>
+            <a:r>
+              <a:rPr lang="en-US" dirty="0" smtClean="0"/>
+              <a:t>Notes: Just a few points we’ve been covering during meetings</a:t>
+            </a:r>
             <a:endParaRPr lang="en-US" dirty="0"/>
           </a:p>
         </p:txBody>
@@ -1132,6 +1194,16 @@
             <a:r>
               <a:rPr lang="en-US" dirty="0" smtClean="0"/>
               <a:t>Jeff</a:t>
+            </a:r>
+          </a:p>
+          <a:p>
+            <a:r>
+              <a:rPr lang="en-US" dirty="0" smtClean="0"/>
+              <a:t>Notes: Our guess at what the main requirements will look like, based on our meetings</a:t>
+            </a:r>
+            <a:r>
+              <a:rPr lang="en-US" baseline="0" dirty="0" smtClean="0"/>
+              <a:t> with Walker. Also has to ‘float’</a:t>
             </a:r>
             <a:endParaRPr lang="en-US" dirty="0"/>
           </a:p>
@@ -1221,6 +1293,24 @@
               <a:rPr lang="en-US" dirty="0" smtClean="0"/>
               <a:t>Jeff</a:t>
             </a:r>
+          </a:p>
+          <a:p>
+            <a:r>
+              <a:rPr lang="en-US" dirty="0" smtClean="0"/>
+              <a:t>Notes: Beginning</a:t>
+            </a:r>
+            <a:r>
+              <a:rPr lang="en-US" baseline="0" dirty="0" smtClean="0"/>
+              <a:t> research on some required parts. Also will need a </a:t>
+            </a:r>
+            <a:r>
+              <a:rPr lang="en-US" baseline="0" dirty="0" err="1" smtClean="0"/>
+              <a:t>MicroChip</a:t>
+            </a:r>
+            <a:r>
+              <a:rPr lang="en-US" baseline="0" dirty="0" smtClean="0"/>
+              <a:t> PIC controller, still doing research</a:t>
+            </a:r>
             <a:endParaRPr lang="en-US" dirty="0"/>
           </a:p>
         </p:txBody>
@@ -1308,6 +1398,16 @@
             <a:r>
               <a:rPr lang="en-US" dirty="0" smtClean="0"/>
               <a:t>CM</a:t>
+            </a:r>
+          </a:p>
+          <a:p>
+            <a:r>
+              <a:rPr lang="en-US" dirty="0" smtClean="0"/>
+              <a:t>Notes:</a:t>
+            </a:r>
+            <a:r>
+              <a:rPr lang="en-US" baseline="0" dirty="0" smtClean="0"/>
+              <a:t> These are just the most important of the risks we may encounter</a:t>
             </a:r>
             <a:endParaRPr lang="en-US" dirty="0"/>
           </a:p>

</xml_diff>